<commit_message>
Interface Structure Change and new Classes as mentioned in development.pptx file
</commit_message>
<xml_diff>
--- a/Documentations/Development.pptx
+++ b/Documentations/Development.pptx
@@ -8,6 +8,8 @@
     <p:sldId id="256" r:id="rId2"/>
     <p:sldId id="260" r:id="rId3"/>
     <p:sldId id="261" r:id="rId4"/>
+    <p:sldId id="264" r:id="rId5"/>
+    <p:sldId id="263" r:id="rId6"/>
   </p:sldIdLst>
   <p:sldSz cx="9144000" cy="6858000" type="screen4x3"/>
   <p:notesSz cx="6858000" cy="9144000"/>
@@ -290,7 +292,7 @@
           <a:p>
             <a:fld id="{1BA50D42-C9CD-4801-B293-61D1F53EC57E}" type="datetimeFigureOut">
               <a:rPr lang="de-DE" smtClean="0"/>
-              <a:t>18.05.2020</a:t>
+              <a:t>23.05.2020</a:t>
             </a:fld>
             <a:endParaRPr lang="de-DE"/>
           </a:p>
@@ -455,7 +457,7 @@
           <a:p>
             <a:fld id="{1BA50D42-C9CD-4801-B293-61D1F53EC57E}" type="datetimeFigureOut">
               <a:rPr lang="de-DE" smtClean="0"/>
-              <a:t>18.05.2020</a:t>
+              <a:t>23.05.2020</a:t>
             </a:fld>
             <a:endParaRPr lang="de-DE"/>
           </a:p>
@@ -630,7 +632,7 @@
           <a:p>
             <a:fld id="{1BA50D42-C9CD-4801-B293-61D1F53EC57E}" type="datetimeFigureOut">
               <a:rPr lang="de-DE" smtClean="0"/>
-              <a:t>18.05.2020</a:t>
+              <a:t>23.05.2020</a:t>
             </a:fld>
             <a:endParaRPr lang="de-DE"/>
           </a:p>
@@ -795,7 +797,7 @@
           <a:p>
             <a:fld id="{1BA50D42-C9CD-4801-B293-61D1F53EC57E}" type="datetimeFigureOut">
               <a:rPr lang="de-DE" smtClean="0"/>
-              <a:t>18.05.2020</a:t>
+              <a:t>23.05.2020</a:t>
             </a:fld>
             <a:endParaRPr lang="de-DE"/>
           </a:p>
@@ -1036,7 +1038,7 @@
           <a:p>
             <a:fld id="{1BA50D42-C9CD-4801-B293-61D1F53EC57E}" type="datetimeFigureOut">
               <a:rPr lang="de-DE" smtClean="0"/>
-              <a:t>18.05.2020</a:t>
+              <a:t>23.05.2020</a:t>
             </a:fld>
             <a:endParaRPr lang="de-DE"/>
           </a:p>
@@ -1319,7 +1321,7 @@
           <a:p>
             <a:fld id="{1BA50D42-C9CD-4801-B293-61D1F53EC57E}" type="datetimeFigureOut">
               <a:rPr lang="de-DE" smtClean="0"/>
-              <a:t>18.05.2020</a:t>
+              <a:t>23.05.2020</a:t>
             </a:fld>
             <a:endParaRPr lang="de-DE"/>
           </a:p>
@@ -1736,7 +1738,7 @@
           <a:p>
             <a:fld id="{1BA50D42-C9CD-4801-B293-61D1F53EC57E}" type="datetimeFigureOut">
               <a:rPr lang="de-DE" smtClean="0"/>
-              <a:t>18.05.2020</a:t>
+              <a:t>23.05.2020</a:t>
             </a:fld>
             <a:endParaRPr lang="de-DE"/>
           </a:p>
@@ -1849,7 +1851,7 @@
           <a:p>
             <a:fld id="{1BA50D42-C9CD-4801-B293-61D1F53EC57E}" type="datetimeFigureOut">
               <a:rPr lang="de-DE" smtClean="0"/>
-              <a:t>18.05.2020</a:t>
+              <a:t>23.05.2020</a:t>
             </a:fld>
             <a:endParaRPr lang="de-DE"/>
           </a:p>
@@ -1939,7 +1941,7 @@
           <a:p>
             <a:fld id="{1BA50D42-C9CD-4801-B293-61D1F53EC57E}" type="datetimeFigureOut">
               <a:rPr lang="de-DE" smtClean="0"/>
-              <a:t>18.05.2020</a:t>
+              <a:t>23.05.2020</a:t>
             </a:fld>
             <a:endParaRPr lang="de-DE"/>
           </a:p>
@@ -2211,7 +2213,7 @@
           <a:p>
             <a:fld id="{1BA50D42-C9CD-4801-B293-61D1F53EC57E}" type="datetimeFigureOut">
               <a:rPr lang="de-DE" smtClean="0"/>
-              <a:t>18.05.2020</a:t>
+              <a:t>23.05.2020</a:t>
             </a:fld>
             <a:endParaRPr lang="de-DE"/>
           </a:p>
@@ -2459,7 +2461,7 @@
           <a:p>
             <a:fld id="{1BA50D42-C9CD-4801-B293-61D1F53EC57E}" type="datetimeFigureOut">
               <a:rPr lang="de-DE" smtClean="0"/>
-              <a:t>18.05.2020</a:t>
+              <a:t>23.05.2020</a:t>
             </a:fld>
             <a:endParaRPr lang="de-DE"/>
           </a:p>
@@ -2667,7 +2669,7 @@
           <a:p>
             <a:fld id="{1BA50D42-C9CD-4801-B293-61D1F53EC57E}" type="datetimeFigureOut">
               <a:rPr lang="de-DE" smtClean="0"/>
-              <a:t>18.05.2020</a:t>
+              <a:t>23.05.2020</a:t>
             </a:fld>
             <a:endParaRPr lang="de-DE"/>
           </a:p>
@@ -4480,6 +4482,1785 @@
     <p:extLst>
       <p:ext uri="{BB962C8B-B14F-4D97-AF65-F5344CB8AC3E}">
         <p14:creationId xmlns:p14="http://schemas.microsoft.com/office/powerpoint/2010/main" val="162836904"/>
+      </p:ext>
+    </p:extLst>
+  </p:cSld>
+  <p:clrMapOvr>
+    <a:masterClrMapping/>
+  </p:clrMapOvr>
+</p:sld>
+</file>
+
+<file path=ppt/slides/slide4.xml><?xml version="1.0" encoding="utf-8"?>
+<p:sld xmlns:a="http://schemas.openxmlformats.org/drawingml/2006/main" xmlns:r="http://schemas.openxmlformats.org/officeDocument/2006/relationships" xmlns:p="http://schemas.openxmlformats.org/presentationml/2006/main">
+  <p:cSld>
+    <p:spTree>
+      <p:nvGrpSpPr>
+        <p:cNvPr id="1" name=""/>
+        <p:cNvGrpSpPr/>
+        <p:nvPr/>
+      </p:nvGrpSpPr>
+      <p:grpSpPr>
+        <a:xfrm>
+          <a:off x="0" y="0"/>
+          <a:ext cx="0" cy="0"/>
+          <a:chOff x="0" y="0"/>
+          <a:chExt cx="0" cy="0"/>
+        </a:xfrm>
+      </p:grpSpPr>
+      <p:sp>
+        <p:nvSpPr>
+          <p:cNvPr id="2" name="Titel 1"/>
+          <p:cNvSpPr>
+            <a:spLocks noGrp="1"/>
+          </p:cNvSpPr>
+          <p:nvPr>
+            <p:ph type="title"/>
+          </p:nvPr>
+        </p:nvSpPr>
+        <p:spPr>
+          <a:xfrm>
+            <a:off x="0" y="0"/>
+            <a:ext cx="9144000" cy="260648"/>
+          </a:xfrm>
+          <a:solidFill>
+            <a:schemeClr val="bg1">
+              <a:lumMod val="85000"/>
+            </a:schemeClr>
+          </a:solidFill>
+        </p:spPr>
+        <p:txBody>
+          <a:bodyPr>
+            <a:noAutofit/>
+          </a:bodyPr>
+          <a:lstStyle/>
+          <a:p>
+            <a:endParaRPr lang="de-DE" sz="1800" dirty="0"/>
+          </a:p>
+        </p:txBody>
+      </p:sp>
+      <p:sp>
+        <p:nvSpPr>
+          <p:cNvPr id="23" name="Rechteck 22"/>
+          <p:cNvSpPr/>
+          <p:nvPr/>
+        </p:nvSpPr>
+        <p:spPr>
+          <a:xfrm>
+            <a:off x="1763688" y="1772816"/>
+            <a:ext cx="4896544" cy="216024"/>
+          </a:xfrm>
+          <a:prstGeom prst="rect">
+            <a:avLst/>
+          </a:prstGeom>
+          <a:noFill/>
+          <a:ln>
+            <a:solidFill>
+              <a:schemeClr val="tx1"/>
+            </a:solidFill>
+          </a:ln>
+        </p:spPr>
+        <p:style>
+          <a:lnRef idx="2">
+            <a:schemeClr val="accent1">
+              <a:shade val="50000"/>
+            </a:schemeClr>
+          </a:lnRef>
+          <a:fillRef idx="1">
+            <a:schemeClr val="accent1"/>
+          </a:fillRef>
+          <a:effectRef idx="0">
+            <a:schemeClr val="accent1"/>
+          </a:effectRef>
+          <a:fontRef idx="minor">
+            <a:schemeClr val="lt1"/>
+          </a:fontRef>
+        </p:style>
+        <p:txBody>
+          <a:bodyPr rtlCol="0" anchor="ctr"/>
+          <a:lstStyle/>
+          <a:p>
+            <a:pPr algn="ctr"/>
+            <a:endParaRPr lang="de-DE"/>
+          </a:p>
+        </p:txBody>
+      </p:sp>
+      <p:sp>
+        <p:nvSpPr>
+          <p:cNvPr id="24" name="Rechteck 23"/>
+          <p:cNvSpPr/>
+          <p:nvPr/>
+        </p:nvSpPr>
+        <p:spPr>
+          <a:xfrm>
+            <a:off x="1763688" y="1988840"/>
+            <a:ext cx="864096" cy="3096344"/>
+          </a:xfrm>
+          <a:prstGeom prst="rect">
+            <a:avLst/>
+          </a:prstGeom>
+          <a:noFill/>
+          <a:ln>
+            <a:solidFill>
+              <a:schemeClr val="tx1"/>
+            </a:solidFill>
+          </a:ln>
+        </p:spPr>
+        <p:style>
+          <a:lnRef idx="2">
+            <a:schemeClr val="accent1">
+              <a:shade val="50000"/>
+            </a:schemeClr>
+          </a:lnRef>
+          <a:fillRef idx="1">
+            <a:schemeClr val="accent1"/>
+          </a:fillRef>
+          <a:effectRef idx="0">
+            <a:schemeClr val="accent1"/>
+          </a:effectRef>
+          <a:fontRef idx="minor">
+            <a:schemeClr val="lt1"/>
+          </a:fontRef>
+        </p:style>
+        <p:txBody>
+          <a:bodyPr rtlCol="0" anchor="ctr"/>
+          <a:lstStyle/>
+          <a:p>
+            <a:pPr algn="ctr"/>
+            <a:r>
+              <a:rPr lang="de-DE" sz="1100" dirty="0" smtClean="0">
+                <a:solidFill>
+                  <a:schemeClr val="tx1"/>
+                </a:solidFill>
+              </a:rPr>
+              <a:t>Projects</a:t>
+            </a:r>
+            <a:endParaRPr lang="de-DE" sz="1100" dirty="0">
+              <a:solidFill>
+                <a:schemeClr val="tx1"/>
+              </a:solidFill>
+            </a:endParaRPr>
+          </a:p>
+        </p:txBody>
+      </p:sp>
+      <p:sp>
+        <p:nvSpPr>
+          <p:cNvPr id="25" name="Rechteck 24"/>
+          <p:cNvSpPr/>
+          <p:nvPr/>
+        </p:nvSpPr>
+        <p:spPr>
+          <a:xfrm>
+            <a:off x="5796136" y="1984251"/>
+            <a:ext cx="864096" cy="3096344"/>
+          </a:xfrm>
+          <a:prstGeom prst="rect">
+            <a:avLst/>
+          </a:prstGeom>
+          <a:noFill/>
+          <a:ln>
+            <a:solidFill>
+              <a:schemeClr val="tx1"/>
+            </a:solidFill>
+          </a:ln>
+        </p:spPr>
+        <p:style>
+          <a:lnRef idx="2">
+            <a:schemeClr val="accent1">
+              <a:shade val="50000"/>
+            </a:schemeClr>
+          </a:lnRef>
+          <a:fillRef idx="1">
+            <a:schemeClr val="accent1"/>
+          </a:fillRef>
+          <a:effectRef idx="0">
+            <a:schemeClr val="accent1"/>
+          </a:effectRef>
+          <a:fontRef idx="minor">
+            <a:schemeClr val="lt1"/>
+          </a:fontRef>
+        </p:style>
+        <p:txBody>
+          <a:bodyPr rtlCol="0" anchor="ctr"/>
+          <a:lstStyle/>
+          <a:p>
+            <a:pPr algn="ctr"/>
+            <a:r>
+              <a:rPr lang="de-DE" sz="1200" dirty="0" smtClean="0">
+                <a:solidFill>
+                  <a:schemeClr val="tx1"/>
+                </a:solidFill>
+              </a:rPr>
+              <a:t>Content</a:t>
+            </a:r>
+            <a:endParaRPr lang="de-DE" sz="1200" dirty="0">
+              <a:solidFill>
+                <a:schemeClr val="tx1"/>
+              </a:solidFill>
+            </a:endParaRPr>
+          </a:p>
+        </p:txBody>
+      </p:sp>
+      <p:sp>
+        <p:nvSpPr>
+          <p:cNvPr id="26" name="Rechteck 25"/>
+          <p:cNvSpPr/>
+          <p:nvPr/>
+        </p:nvSpPr>
+        <p:spPr>
+          <a:xfrm>
+            <a:off x="2627784" y="1988840"/>
+            <a:ext cx="3168352" cy="648072"/>
+          </a:xfrm>
+          <a:prstGeom prst="rect">
+            <a:avLst/>
+          </a:prstGeom>
+          <a:noFill/>
+          <a:ln>
+            <a:solidFill>
+              <a:schemeClr val="tx1"/>
+            </a:solidFill>
+          </a:ln>
+        </p:spPr>
+        <p:style>
+          <a:lnRef idx="2">
+            <a:schemeClr val="accent1">
+              <a:shade val="50000"/>
+            </a:schemeClr>
+          </a:lnRef>
+          <a:fillRef idx="1">
+            <a:schemeClr val="accent1"/>
+          </a:fillRef>
+          <a:effectRef idx="0">
+            <a:schemeClr val="accent1"/>
+          </a:effectRef>
+          <a:fontRef idx="minor">
+            <a:schemeClr val="lt1"/>
+          </a:fontRef>
+        </p:style>
+        <p:txBody>
+          <a:bodyPr rtlCol="0" anchor="ctr"/>
+          <a:lstStyle/>
+          <a:p>
+            <a:pPr algn="ctr"/>
+            <a:r>
+              <a:rPr lang="de-DE" dirty="0" err="1" smtClean="0">
+                <a:solidFill>
+                  <a:schemeClr val="tx1"/>
+                </a:solidFill>
+              </a:rPr>
+              <a:t>ProjectFolders</a:t>
+            </a:r>
+            <a:endParaRPr lang="de-DE" dirty="0">
+              <a:solidFill>
+                <a:schemeClr val="tx1"/>
+              </a:solidFill>
+            </a:endParaRPr>
+          </a:p>
+        </p:txBody>
+      </p:sp>
+      <p:sp>
+        <p:nvSpPr>
+          <p:cNvPr id="27" name="Rechteck 26"/>
+          <p:cNvSpPr/>
+          <p:nvPr/>
+        </p:nvSpPr>
+        <p:spPr>
+          <a:xfrm>
+            <a:off x="2627783" y="2636912"/>
+            <a:ext cx="3152641" cy="2448272"/>
+          </a:xfrm>
+          <a:prstGeom prst="rect">
+            <a:avLst/>
+          </a:prstGeom>
+          <a:noFill/>
+          <a:ln>
+            <a:solidFill>
+              <a:schemeClr val="tx1"/>
+            </a:solidFill>
+          </a:ln>
+        </p:spPr>
+        <p:style>
+          <a:lnRef idx="2">
+            <a:schemeClr val="accent1">
+              <a:shade val="50000"/>
+            </a:schemeClr>
+          </a:lnRef>
+          <a:fillRef idx="1">
+            <a:schemeClr val="accent1"/>
+          </a:fillRef>
+          <a:effectRef idx="0">
+            <a:schemeClr val="accent1"/>
+          </a:effectRef>
+          <a:fontRef idx="minor">
+            <a:schemeClr val="lt1"/>
+          </a:fontRef>
+        </p:style>
+        <p:txBody>
+          <a:bodyPr rtlCol="0" anchor="ctr"/>
+          <a:lstStyle/>
+          <a:p>
+            <a:pPr algn="ctr"/>
+            <a:r>
+              <a:rPr lang="de-DE" dirty="0" smtClean="0">
+                <a:solidFill>
+                  <a:schemeClr val="tx1"/>
+                </a:solidFill>
+              </a:rPr>
+              <a:t>Detail View</a:t>
+            </a:r>
+            <a:endParaRPr lang="de-DE" dirty="0">
+              <a:solidFill>
+                <a:schemeClr val="tx1"/>
+              </a:solidFill>
+            </a:endParaRPr>
+          </a:p>
+        </p:txBody>
+      </p:sp>
+      <p:sp>
+        <p:nvSpPr>
+          <p:cNvPr id="28" name="Rechteck 27"/>
+          <p:cNvSpPr/>
+          <p:nvPr/>
+        </p:nvSpPr>
+        <p:spPr>
+          <a:xfrm>
+            <a:off x="1763688" y="5085184"/>
+            <a:ext cx="4896544" cy="216024"/>
+          </a:xfrm>
+          <a:prstGeom prst="rect">
+            <a:avLst/>
+          </a:prstGeom>
+          <a:noFill/>
+          <a:ln>
+            <a:solidFill>
+              <a:schemeClr val="tx1"/>
+            </a:solidFill>
+          </a:ln>
+        </p:spPr>
+        <p:style>
+          <a:lnRef idx="2">
+            <a:schemeClr val="accent1">
+              <a:shade val="50000"/>
+            </a:schemeClr>
+          </a:lnRef>
+          <a:fillRef idx="1">
+            <a:schemeClr val="accent1"/>
+          </a:fillRef>
+          <a:effectRef idx="0">
+            <a:schemeClr val="accent1"/>
+          </a:effectRef>
+          <a:fontRef idx="minor">
+            <a:schemeClr val="lt1"/>
+          </a:fontRef>
+        </p:style>
+        <p:txBody>
+          <a:bodyPr rtlCol="0" anchor="ctr"/>
+          <a:lstStyle/>
+          <a:p>
+            <a:r>
+              <a:rPr lang="de-DE" dirty="0" smtClean="0">
+                <a:solidFill>
+                  <a:schemeClr val="tx1"/>
+                </a:solidFill>
+              </a:rPr>
+              <a:t>Status Bar</a:t>
+            </a:r>
+            <a:endParaRPr lang="de-DE" dirty="0">
+              <a:solidFill>
+                <a:schemeClr val="tx1"/>
+              </a:solidFill>
+            </a:endParaRPr>
+          </a:p>
+        </p:txBody>
+      </p:sp>
+      <p:sp>
+        <p:nvSpPr>
+          <p:cNvPr id="9" name="Textfeld 8"/>
+          <p:cNvSpPr txBox="1"/>
+          <p:nvPr/>
+        </p:nvSpPr>
+        <p:spPr>
+          <a:xfrm>
+            <a:off x="-2032" y="2996952"/>
+            <a:ext cx="1947264" cy="1200329"/>
+          </a:xfrm>
+          <a:prstGeom prst="rect">
+            <a:avLst/>
+          </a:prstGeom>
+          <a:noFill/>
+        </p:spPr>
+        <p:txBody>
+          <a:bodyPr wrap="none" rtlCol="0">
+            <a:spAutoFit/>
+          </a:bodyPr>
+          <a:lstStyle/>
+          <a:p>
+            <a:pPr marL="285750" indent="-285750">
+              <a:buFont typeface="Arial" panose="020B0604020202020204" pitchFamily="34" charset="0"/>
+              <a:buChar char="•"/>
+            </a:pPr>
+            <a:r>
+              <a:rPr lang="de-DE" dirty="0" smtClean="0">
+                <a:solidFill>
+                  <a:srgbClr val="FF0000"/>
+                </a:solidFill>
+              </a:rPr>
+              <a:t>Add</a:t>
+            </a:r>
+          </a:p>
+          <a:p>
+            <a:pPr marL="285750" indent="-285750">
+              <a:buFont typeface="Arial" panose="020B0604020202020204" pitchFamily="34" charset="0"/>
+              <a:buChar char="•"/>
+            </a:pPr>
+            <a:r>
+              <a:rPr lang="de-DE" dirty="0" smtClean="0">
+                <a:solidFill>
+                  <a:srgbClr val="FF0000"/>
+                </a:solidFill>
+              </a:rPr>
+              <a:t>Del</a:t>
+            </a:r>
+          </a:p>
+          <a:p>
+            <a:pPr marL="285750" indent="-285750">
+              <a:buFont typeface="Arial" panose="020B0604020202020204" pitchFamily="34" charset="0"/>
+              <a:buChar char="•"/>
+            </a:pPr>
+            <a:r>
+              <a:rPr lang="de-DE" dirty="0" err="1" smtClean="0">
+                <a:solidFill>
+                  <a:srgbClr val="FF0000"/>
+                </a:solidFill>
+              </a:rPr>
+              <a:t>ShowInExplorer</a:t>
+            </a:r>
+            <a:endParaRPr lang="de-DE" dirty="0" smtClean="0">
+              <a:solidFill>
+                <a:srgbClr val="FF0000"/>
+              </a:solidFill>
+            </a:endParaRPr>
+          </a:p>
+          <a:p>
+            <a:pPr marL="285750" indent="-285750">
+              <a:buFont typeface="Arial" panose="020B0604020202020204" pitchFamily="34" charset="0"/>
+              <a:buChar char="•"/>
+            </a:pPr>
+            <a:r>
+              <a:rPr lang="de-DE" dirty="0" smtClean="0">
+                <a:solidFill>
+                  <a:srgbClr val="FF0000"/>
+                </a:solidFill>
+              </a:rPr>
+              <a:t>ZIP/Export</a:t>
+            </a:r>
+            <a:endParaRPr lang="de-DE" dirty="0">
+              <a:solidFill>
+                <a:srgbClr val="FF0000"/>
+              </a:solidFill>
+            </a:endParaRPr>
+          </a:p>
+        </p:txBody>
+      </p:sp>
+      <p:sp>
+        <p:nvSpPr>
+          <p:cNvPr id="11" name="Textfeld 10"/>
+          <p:cNvSpPr txBox="1"/>
+          <p:nvPr/>
+        </p:nvSpPr>
+        <p:spPr>
+          <a:xfrm>
+            <a:off x="6732240" y="2968441"/>
+            <a:ext cx="1947264" cy="1200329"/>
+          </a:xfrm>
+          <a:prstGeom prst="rect">
+            <a:avLst/>
+          </a:prstGeom>
+          <a:noFill/>
+        </p:spPr>
+        <p:txBody>
+          <a:bodyPr wrap="none" rtlCol="0">
+            <a:spAutoFit/>
+          </a:bodyPr>
+          <a:lstStyle/>
+          <a:p>
+            <a:pPr marL="285750" indent="-285750">
+              <a:buFont typeface="Arial" panose="020B0604020202020204" pitchFamily="34" charset="0"/>
+              <a:buChar char="•"/>
+            </a:pPr>
+            <a:r>
+              <a:rPr lang="de-DE" dirty="0" smtClean="0">
+                <a:solidFill>
+                  <a:srgbClr val="FF0000"/>
+                </a:solidFill>
+              </a:rPr>
+              <a:t>Add</a:t>
+            </a:r>
+          </a:p>
+          <a:p>
+            <a:pPr marL="285750" indent="-285750">
+              <a:buFont typeface="Arial" panose="020B0604020202020204" pitchFamily="34" charset="0"/>
+              <a:buChar char="•"/>
+            </a:pPr>
+            <a:r>
+              <a:rPr lang="de-DE" dirty="0" smtClean="0">
+                <a:solidFill>
+                  <a:srgbClr val="FF0000"/>
+                </a:solidFill>
+              </a:rPr>
+              <a:t>Del</a:t>
+            </a:r>
+          </a:p>
+          <a:p>
+            <a:pPr marL="285750" indent="-285750">
+              <a:buFont typeface="Arial" panose="020B0604020202020204" pitchFamily="34" charset="0"/>
+              <a:buChar char="•"/>
+            </a:pPr>
+            <a:r>
+              <a:rPr lang="de-DE" dirty="0" err="1" smtClean="0">
+                <a:solidFill>
+                  <a:srgbClr val="FF0000"/>
+                </a:solidFill>
+              </a:rPr>
+              <a:t>ShowInExplorer</a:t>
+            </a:r>
+            <a:endParaRPr lang="de-DE" dirty="0" smtClean="0">
+              <a:solidFill>
+                <a:srgbClr val="FF0000"/>
+              </a:solidFill>
+            </a:endParaRPr>
+          </a:p>
+          <a:p>
+            <a:pPr marL="285750" indent="-285750">
+              <a:buFont typeface="Arial" panose="020B0604020202020204" pitchFamily="34" charset="0"/>
+              <a:buChar char="•"/>
+            </a:pPr>
+            <a:r>
+              <a:rPr lang="de-DE" dirty="0" err="1" smtClean="0">
+                <a:solidFill>
+                  <a:srgbClr val="FF0000"/>
+                </a:solidFill>
+              </a:rPr>
+              <a:t>Drag‘n‘Drop</a:t>
+            </a:r>
+            <a:endParaRPr lang="de-DE" dirty="0" smtClean="0">
+              <a:solidFill>
+                <a:srgbClr val="FF0000"/>
+              </a:solidFill>
+            </a:endParaRPr>
+          </a:p>
+        </p:txBody>
+      </p:sp>
+      <p:sp>
+        <p:nvSpPr>
+          <p:cNvPr id="12" name="Textfeld 11"/>
+          <p:cNvSpPr txBox="1"/>
+          <p:nvPr/>
+        </p:nvSpPr>
+        <p:spPr>
+          <a:xfrm>
+            <a:off x="3230471" y="476672"/>
+            <a:ext cx="1947264" cy="1200329"/>
+          </a:xfrm>
+          <a:prstGeom prst="rect">
+            <a:avLst/>
+          </a:prstGeom>
+          <a:noFill/>
+        </p:spPr>
+        <p:txBody>
+          <a:bodyPr wrap="none" rtlCol="0">
+            <a:spAutoFit/>
+          </a:bodyPr>
+          <a:lstStyle/>
+          <a:p>
+            <a:pPr marL="285750" indent="-285750">
+              <a:buFont typeface="Arial" panose="020B0604020202020204" pitchFamily="34" charset="0"/>
+              <a:buChar char="•"/>
+            </a:pPr>
+            <a:r>
+              <a:rPr lang="de-DE" dirty="0" smtClean="0">
+                <a:solidFill>
+                  <a:srgbClr val="FF0000"/>
+                </a:solidFill>
+              </a:rPr>
+              <a:t>Add</a:t>
+            </a:r>
+          </a:p>
+          <a:p>
+            <a:pPr marL="285750" indent="-285750">
+              <a:buFont typeface="Arial" panose="020B0604020202020204" pitchFamily="34" charset="0"/>
+              <a:buChar char="•"/>
+            </a:pPr>
+            <a:r>
+              <a:rPr lang="de-DE" dirty="0" smtClean="0">
+                <a:solidFill>
+                  <a:srgbClr val="FF0000"/>
+                </a:solidFill>
+              </a:rPr>
+              <a:t>Del</a:t>
+            </a:r>
+          </a:p>
+          <a:p>
+            <a:pPr marL="285750" indent="-285750">
+              <a:buFont typeface="Arial" panose="020B0604020202020204" pitchFamily="34" charset="0"/>
+              <a:buChar char="•"/>
+            </a:pPr>
+            <a:r>
+              <a:rPr lang="de-DE" dirty="0" err="1" smtClean="0">
+                <a:solidFill>
+                  <a:srgbClr val="FF0000"/>
+                </a:solidFill>
+              </a:rPr>
+              <a:t>ShowInExplorer</a:t>
+            </a:r>
+            <a:endParaRPr lang="de-DE" dirty="0" smtClean="0">
+              <a:solidFill>
+                <a:srgbClr val="FF0000"/>
+              </a:solidFill>
+            </a:endParaRPr>
+          </a:p>
+          <a:p>
+            <a:pPr marL="285750" indent="-285750">
+              <a:buFont typeface="Arial" panose="020B0604020202020204" pitchFamily="34" charset="0"/>
+              <a:buChar char="•"/>
+            </a:pPr>
+            <a:r>
+              <a:rPr lang="de-DE" dirty="0" err="1" smtClean="0">
+                <a:solidFill>
+                  <a:srgbClr val="FF0000"/>
+                </a:solidFill>
+              </a:rPr>
+              <a:t>Drag‘n‘Drop</a:t>
+            </a:r>
+            <a:endParaRPr lang="de-DE" dirty="0" smtClean="0">
+              <a:solidFill>
+                <a:srgbClr val="FF0000"/>
+              </a:solidFill>
+            </a:endParaRPr>
+          </a:p>
+        </p:txBody>
+      </p:sp>
+    </p:spTree>
+    <p:extLst>
+      <p:ext uri="{BB962C8B-B14F-4D97-AF65-F5344CB8AC3E}">
+        <p14:creationId xmlns:p14="http://schemas.microsoft.com/office/powerpoint/2010/main" val="3809116441"/>
+      </p:ext>
+    </p:extLst>
+  </p:cSld>
+  <p:clrMapOvr>
+    <a:masterClrMapping/>
+  </p:clrMapOvr>
+</p:sld>
+</file>
+
+<file path=ppt/slides/slide5.xml><?xml version="1.0" encoding="utf-8"?>
+<p:sld xmlns:a="http://schemas.openxmlformats.org/drawingml/2006/main" xmlns:r="http://schemas.openxmlformats.org/officeDocument/2006/relationships" xmlns:p="http://schemas.openxmlformats.org/presentationml/2006/main">
+  <p:cSld>
+    <p:spTree>
+      <p:nvGrpSpPr>
+        <p:cNvPr id="1" name=""/>
+        <p:cNvGrpSpPr/>
+        <p:nvPr/>
+      </p:nvGrpSpPr>
+      <p:grpSpPr>
+        <a:xfrm>
+          <a:off x="0" y="0"/>
+          <a:ext cx="0" cy="0"/>
+          <a:chOff x="0" y="0"/>
+          <a:chExt cx="0" cy="0"/>
+        </a:xfrm>
+      </p:grpSpPr>
+      <p:sp>
+        <p:nvSpPr>
+          <p:cNvPr id="2" name="Titel 1"/>
+          <p:cNvSpPr>
+            <a:spLocks noGrp="1"/>
+          </p:cNvSpPr>
+          <p:nvPr>
+            <p:ph type="title"/>
+          </p:nvPr>
+        </p:nvSpPr>
+        <p:spPr>
+          <a:xfrm>
+            <a:off x="0" y="0"/>
+            <a:ext cx="9144000" cy="260648"/>
+          </a:xfrm>
+          <a:solidFill>
+            <a:schemeClr val="bg1">
+              <a:lumMod val="85000"/>
+            </a:schemeClr>
+          </a:solidFill>
+        </p:spPr>
+        <p:txBody>
+          <a:bodyPr>
+            <a:noAutofit/>
+          </a:bodyPr>
+          <a:lstStyle/>
+          <a:p>
+            <a:r>
+              <a:rPr lang="de-DE" sz="1800" dirty="0" smtClean="0"/>
+              <a:t>Filesystem </a:t>
+            </a:r>
+            <a:r>
+              <a:rPr lang="de-DE" sz="1800" dirty="0" err="1" smtClean="0"/>
+              <a:t>Structure</a:t>
+            </a:r>
+            <a:r>
+              <a:rPr lang="de-DE" sz="1800" dirty="0" smtClean="0"/>
+              <a:t> </a:t>
+            </a:r>
+            <a:r>
+              <a:rPr lang="de-DE" sz="1800" dirty="0" err="1" smtClean="0"/>
+              <a:t>and</a:t>
+            </a:r>
+            <a:r>
+              <a:rPr lang="de-DE" sz="1800" dirty="0" smtClean="0"/>
+              <a:t> </a:t>
+            </a:r>
+            <a:r>
+              <a:rPr lang="de-DE" sz="1800" dirty="0" err="1" smtClean="0"/>
+              <a:t>Classes</a:t>
+            </a:r>
+            <a:r>
+              <a:rPr lang="de-DE" sz="1800" dirty="0" smtClean="0"/>
+              <a:t> </a:t>
+            </a:r>
+            <a:r>
+              <a:rPr lang="de-DE" sz="1800" dirty="0" err="1"/>
+              <a:t>R</a:t>
+            </a:r>
+            <a:r>
+              <a:rPr lang="de-DE" sz="1800" dirty="0" err="1" smtClean="0"/>
+              <a:t>epresentation</a:t>
+            </a:r>
+            <a:endParaRPr lang="de-DE" sz="1800" dirty="0"/>
+          </a:p>
+        </p:txBody>
+      </p:sp>
+      <p:grpSp>
+        <p:nvGrpSpPr>
+          <p:cNvPr id="35" name="Gruppieren 34"/>
+          <p:cNvGrpSpPr/>
+          <p:nvPr/>
+        </p:nvGrpSpPr>
+        <p:grpSpPr>
+          <a:xfrm>
+            <a:off x="189317" y="416207"/>
+            <a:ext cx="8532440" cy="3426870"/>
+            <a:chOff x="611560" y="1156248"/>
+            <a:chExt cx="8532440" cy="3426870"/>
+          </a:xfrm>
+        </p:grpSpPr>
+        <p:sp>
+          <p:nvSpPr>
+            <p:cNvPr id="3" name="Textfeld 2"/>
+            <p:cNvSpPr txBox="1"/>
+            <p:nvPr/>
+          </p:nvSpPr>
+          <p:spPr>
+            <a:xfrm>
+              <a:off x="611560" y="1720796"/>
+              <a:ext cx="2712602" cy="2862322"/>
+            </a:xfrm>
+            <a:prstGeom prst="rect">
+              <a:avLst/>
+            </a:prstGeom>
+            <a:noFill/>
+          </p:spPr>
+          <p:txBody>
+            <a:bodyPr wrap="none" rtlCol="0">
+              <a:spAutoFit/>
+            </a:bodyPr>
+            <a:lstStyle/>
+            <a:p>
+              <a:pPr marL="285750" indent="-285750">
+                <a:buFont typeface="Arial" panose="020B0604020202020204" pitchFamily="34" charset="0"/>
+                <a:buChar char="•"/>
+              </a:pPr>
+              <a:r>
+                <a:rPr lang="de-DE" dirty="0" smtClean="0">
+                  <a:solidFill>
+                    <a:srgbClr val="FF0000"/>
+                  </a:solidFill>
+                </a:rPr>
+                <a:t>(PRJ) – Project Name</a:t>
+              </a:r>
+              <a:endParaRPr lang="de-DE" dirty="0" smtClean="0">
+                <a:solidFill>
+                  <a:srgbClr val="FF0000"/>
+                </a:solidFill>
+              </a:endParaRPr>
+            </a:p>
+            <a:p>
+              <a:pPr marL="742950" lvl="1" indent="-285750">
+                <a:buFont typeface="Arial" panose="020B0604020202020204" pitchFamily="34" charset="0"/>
+                <a:buChar char="•"/>
+              </a:pPr>
+              <a:r>
+                <a:rPr lang="de-DE" dirty="0" smtClean="0">
+                  <a:solidFill>
+                    <a:srgbClr val="FF0000"/>
+                  </a:solidFill>
+                </a:rPr>
+                <a:t>EMAIL</a:t>
+              </a:r>
+            </a:p>
+            <a:p>
+              <a:pPr marL="742950" lvl="1" indent="-285750">
+                <a:buFont typeface="Arial" panose="020B0604020202020204" pitchFamily="34" charset="0"/>
+                <a:buChar char="•"/>
+              </a:pPr>
+              <a:r>
+                <a:rPr lang="de-DE" dirty="0" err="1" smtClean="0">
+                  <a:solidFill>
+                    <a:srgbClr val="FF0000"/>
+                  </a:solidFill>
+                </a:rPr>
+                <a:t>Documentation</a:t>
+              </a:r>
+              <a:endParaRPr lang="de-DE" dirty="0" smtClean="0">
+                <a:solidFill>
+                  <a:srgbClr val="FF0000"/>
+                </a:solidFill>
+              </a:endParaRPr>
+            </a:p>
+            <a:p>
+              <a:pPr marL="742950" lvl="1" indent="-285750">
+                <a:buFont typeface="Arial" panose="020B0604020202020204" pitchFamily="34" charset="0"/>
+                <a:buChar char="•"/>
+              </a:pPr>
+              <a:r>
+                <a:rPr lang="de-DE" dirty="0" smtClean="0">
+                  <a:solidFill>
+                    <a:srgbClr val="FF0000"/>
+                  </a:solidFill>
+                </a:rPr>
+                <a:t>Bin</a:t>
+              </a:r>
+            </a:p>
+            <a:p>
+              <a:pPr marL="1200150" lvl="2" indent="-285750">
+                <a:buFont typeface="Arial" panose="020B0604020202020204" pitchFamily="34" charset="0"/>
+                <a:buChar char="•"/>
+              </a:pPr>
+              <a:r>
+                <a:rPr lang="de-DE" dirty="0" smtClean="0">
+                  <a:solidFill>
+                    <a:srgbClr val="FF0000"/>
+                  </a:solidFill>
+                </a:rPr>
+                <a:t>Driver</a:t>
+              </a:r>
+            </a:p>
+            <a:p>
+              <a:pPr marL="1200150" lvl="2" indent="-285750">
+                <a:buFont typeface="Arial" panose="020B0604020202020204" pitchFamily="34" charset="0"/>
+                <a:buChar char="•"/>
+              </a:pPr>
+              <a:r>
+                <a:rPr lang="de-DE" dirty="0" smtClean="0">
+                  <a:solidFill>
+                    <a:srgbClr val="FF0000"/>
+                  </a:solidFill>
+                </a:rPr>
+                <a:t>Pictures</a:t>
+              </a:r>
+            </a:p>
+            <a:p>
+              <a:pPr marL="1657350" lvl="3" indent="-285750">
+                <a:buFont typeface="Arial" panose="020B0604020202020204" pitchFamily="34" charset="0"/>
+                <a:buChar char="•"/>
+              </a:pPr>
+              <a:r>
+                <a:rPr lang="de-DE" dirty="0" smtClean="0">
+                  <a:solidFill>
+                    <a:srgbClr val="FF0000"/>
+                  </a:solidFill>
+                </a:rPr>
+                <a:t>File1.png</a:t>
+              </a:r>
+            </a:p>
+            <a:p>
+              <a:pPr marL="1657350" lvl="3" indent="-285750">
+                <a:buFont typeface="Arial" panose="020B0604020202020204" pitchFamily="34" charset="0"/>
+                <a:buChar char="•"/>
+              </a:pPr>
+              <a:r>
+                <a:rPr lang="de-DE" dirty="0" smtClean="0">
+                  <a:solidFill>
+                    <a:srgbClr val="FF0000"/>
+                  </a:solidFill>
+                </a:rPr>
+                <a:t>File2.png</a:t>
+              </a:r>
+            </a:p>
+            <a:p>
+              <a:pPr marL="1200150" lvl="2" indent="-285750">
+                <a:buFont typeface="Arial" panose="020B0604020202020204" pitchFamily="34" charset="0"/>
+                <a:buChar char="•"/>
+              </a:pPr>
+              <a:r>
+                <a:rPr lang="de-DE" dirty="0" smtClean="0">
+                  <a:solidFill>
+                    <a:srgbClr val="FF0000"/>
+                  </a:solidFill>
+                </a:rPr>
+                <a:t>File.txt</a:t>
+              </a:r>
+            </a:p>
+            <a:p>
+              <a:pPr marL="1200150" lvl="2" indent="-285750">
+                <a:buFont typeface="Arial" panose="020B0604020202020204" pitchFamily="34" charset="0"/>
+                <a:buChar char="•"/>
+              </a:pPr>
+              <a:r>
+                <a:rPr lang="de-DE" dirty="0" smtClean="0">
+                  <a:solidFill>
+                    <a:srgbClr val="FF0000"/>
+                  </a:solidFill>
+                </a:rPr>
+                <a:t>FileB.doc</a:t>
+              </a:r>
+              <a:endParaRPr lang="de-DE" dirty="0">
+                <a:solidFill>
+                  <a:srgbClr val="FF0000"/>
+                </a:solidFill>
+              </a:endParaRPr>
+            </a:p>
+          </p:txBody>
+        </p:sp>
+        <p:sp>
+          <p:nvSpPr>
+            <p:cNvPr id="4" name="Textfeld 3"/>
+            <p:cNvSpPr txBox="1"/>
+            <p:nvPr/>
+          </p:nvSpPr>
+          <p:spPr>
+            <a:xfrm>
+              <a:off x="611560" y="1340914"/>
+              <a:ext cx="2104872" cy="369332"/>
+            </a:xfrm>
+            <a:prstGeom prst="rect">
+              <a:avLst/>
+            </a:prstGeom>
+            <a:noFill/>
+          </p:spPr>
+          <p:txBody>
+            <a:bodyPr wrap="none" rtlCol="0">
+              <a:spAutoFit/>
+            </a:bodyPr>
+            <a:lstStyle/>
+            <a:p>
+              <a:r>
+                <a:rPr lang="de-DE" dirty="0" err="1" smtClean="0"/>
+                <a:t>FileSystem</a:t>
+              </a:r>
+              <a:r>
+                <a:rPr lang="de-DE" dirty="0" smtClean="0"/>
+                <a:t> </a:t>
+              </a:r>
+              <a:r>
+                <a:rPr lang="de-DE" dirty="0" err="1" smtClean="0"/>
+                <a:t>Structure</a:t>
+              </a:r>
+              <a:endParaRPr lang="de-DE" dirty="0"/>
+            </a:p>
+          </p:txBody>
+        </p:sp>
+        <p:sp>
+          <p:nvSpPr>
+            <p:cNvPr id="11" name="Textfeld 10"/>
+            <p:cNvSpPr txBox="1"/>
+            <p:nvPr/>
+          </p:nvSpPr>
+          <p:spPr>
+            <a:xfrm>
+              <a:off x="3923928" y="1156248"/>
+              <a:ext cx="3195427" cy="369332"/>
+            </a:xfrm>
+            <a:prstGeom prst="rect">
+              <a:avLst/>
+            </a:prstGeom>
+            <a:noFill/>
+          </p:spPr>
+          <p:txBody>
+            <a:bodyPr wrap="none" rtlCol="0">
+              <a:spAutoFit/>
+            </a:bodyPr>
+            <a:lstStyle/>
+            <a:p>
+              <a:r>
+                <a:rPr lang="de-DE" b="1" dirty="0" smtClean="0"/>
+                <a:t>Project</a:t>
+              </a:r>
+              <a:r>
+                <a:rPr lang="de-DE" dirty="0" smtClean="0"/>
+                <a:t>: </a:t>
+              </a:r>
+              <a:r>
+                <a:rPr lang="de-DE" dirty="0" err="1" smtClean="0"/>
+                <a:t>IProject</a:t>
+              </a:r>
+              <a:r>
+                <a:rPr lang="de-DE" dirty="0" smtClean="0"/>
+                <a:t>, </a:t>
+              </a:r>
+              <a:r>
+                <a:rPr lang="de-DE" dirty="0" err="1" smtClean="0"/>
+                <a:t>IContentFolder</a:t>
+              </a:r>
+              <a:endParaRPr lang="de-DE" dirty="0"/>
+            </a:p>
+          </p:txBody>
+        </p:sp>
+        <p:sp>
+          <p:nvSpPr>
+            <p:cNvPr id="12" name="Textfeld 11"/>
+            <p:cNvSpPr txBox="1"/>
+            <p:nvPr/>
+          </p:nvSpPr>
+          <p:spPr>
+            <a:xfrm>
+              <a:off x="3821133" y="1759813"/>
+              <a:ext cx="5322867" cy="369332"/>
+            </a:xfrm>
+            <a:prstGeom prst="rect">
+              <a:avLst/>
+            </a:prstGeom>
+            <a:noFill/>
+          </p:spPr>
+          <p:txBody>
+            <a:bodyPr wrap="none" rtlCol="0">
+              <a:spAutoFit/>
+            </a:bodyPr>
+            <a:lstStyle/>
+            <a:p>
+              <a:r>
+                <a:rPr lang="de-DE" b="1" dirty="0" err="1" smtClean="0"/>
+                <a:t>ProjectFolder</a:t>
+              </a:r>
+              <a:r>
+                <a:rPr lang="de-DE" dirty="0" smtClean="0"/>
+                <a:t>: </a:t>
+              </a:r>
+              <a:r>
+                <a:rPr lang="de-DE" dirty="0" err="1" smtClean="0"/>
+                <a:t>IProjectFolder</a:t>
+              </a:r>
+              <a:r>
+                <a:rPr lang="de-DE" dirty="0" smtClean="0"/>
+                <a:t>, </a:t>
+              </a:r>
+              <a:r>
+                <a:rPr lang="de-DE" dirty="0" err="1" smtClean="0"/>
+                <a:t>IContentFolder</a:t>
+              </a:r>
+              <a:r>
+                <a:rPr lang="de-DE" dirty="0" smtClean="0"/>
+                <a:t>, </a:t>
+              </a:r>
+              <a:r>
+                <a:rPr lang="de-DE" dirty="0" err="1" smtClean="0"/>
+                <a:t>IContent</a:t>
+              </a:r>
+              <a:r>
+                <a:rPr lang="de-DE" dirty="0" smtClean="0"/>
+                <a:t>,</a:t>
+              </a:r>
+              <a:endParaRPr lang="de-DE" dirty="0"/>
+            </a:p>
+          </p:txBody>
+        </p:sp>
+        <p:sp>
+          <p:nvSpPr>
+            <p:cNvPr id="13" name="Textfeld 12"/>
+            <p:cNvSpPr txBox="1"/>
+            <p:nvPr/>
+          </p:nvSpPr>
+          <p:spPr>
+            <a:xfrm>
+              <a:off x="3821133" y="2690292"/>
+              <a:ext cx="3605987" cy="369332"/>
+            </a:xfrm>
+            <a:prstGeom prst="rect">
+              <a:avLst/>
+            </a:prstGeom>
+            <a:noFill/>
+          </p:spPr>
+          <p:txBody>
+            <a:bodyPr wrap="none" rtlCol="0">
+              <a:spAutoFit/>
+            </a:bodyPr>
+            <a:lstStyle/>
+            <a:p>
+              <a:r>
+                <a:rPr lang="de-DE" b="1" dirty="0" err="1" smtClean="0"/>
+                <a:t>SubFolder</a:t>
+              </a:r>
+              <a:r>
+                <a:rPr lang="de-DE" dirty="0" smtClean="0"/>
+                <a:t>: </a:t>
+              </a:r>
+              <a:r>
+                <a:rPr lang="de-DE" dirty="0" err="1" smtClean="0"/>
+                <a:t>IContentFolder</a:t>
+              </a:r>
+              <a:r>
+                <a:rPr lang="de-DE" dirty="0" smtClean="0"/>
+                <a:t>, </a:t>
+              </a:r>
+              <a:r>
+                <a:rPr lang="de-DE" dirty="0" err="1" smtClean="0"/>
+                <a:t>IContent</a:t>
+              </a:r>
+              <a:endParaRPr lang="de-DE" dirty="0"/>
+            </a:p>
+          </p:txBody>
+        </p:sp>
+        <p:sp>
+          <p:nvSpPr>
+            <p:cNvPr id="14" name="Textfeld 13"/>
+            <p:cNvSpPr txBox="1"/>
+            <p:nvPr/>
+          </p:nvSpPr>
+          <p:spPr>
+            <a:xfrm>
+              <a:off x="3923928" y="3448962"/>
+              <a:ext cx="1785745" cy="369332"/>
+            </a:xfrm>
+            <a:prstGeom prst="rect">
+              <a:avLst/>
+            </a:prstGeom>
+            <a:noFill/>
+          </p:spPr>
+          <p:txBody>
+            <a:bodyPr wrap="none" rtlCol="0">
+              <a:spAutoFit/>
+            </a:bodyPr>
+            <a:lstStyle/>
+            <a:p>
+              <a:r>
+                <a:rPr lang="de-DE" b="1" dirty="0" err="1" smtClean="0"/>
+                <a:t>SubFile</a:t>
+              </a:r>
+              <a:r>
+                <a:rPr lang="de-DE" dirty="0" smtClean="0"/>
+                <a:t>: </a:t>
+              </a:r>
+              <a:r>
+                <a:rPr lang="de-DE" dirty="0" err="1" smtClean="0"/>
+                <a:t>IContent</a:t>
+              </a:r>
+              <a:endParaRPr lang="de-DE" dirty="0"/>
+            </a:p>
+          </p:txBody>
+        </p:sp>
+        <p:cxnSp>
+          <p:nvCxnSpPr>
+            <p:cNvPr id="6" name="Gerade Verbindung mit Pfeil 5"/>
+            <p:cNvCxnSpPr>
+              <a:stCxn id="11" idx="1"/>
+            </p:cNvCxnSpPr>
+            <p:nvPr/>
+          </p:nvCxnSpPr>
+          <p:spPr>
+            <a:xfrm flipH="1">
+              <a:off x="3038315" y="1340914"/>
+              <a:ext cx="885613" cy="418899"/>
+            </a:xfrm>
+            <a:prstGeom prst="straightConnector1">
+              <a:avLst/>
+            </a:prstGeom>
+            <a:ln>
+              <a:tailEnd type="arrow"/>
+            </a:ln>
+          </p:spPr>
+          <p:style>
+            <a:lnRef idx="1">
+              <a:schemeClr val="accent1"/>
+            </a:lnRef>
+            <a:fillRef idx="0">
+              <a:schemeClr val="accent1"/>
+            </a:fillRef>
+            <a:effectRef idx="0">
+              <a:schemeClr val="accent1"/>
+            </a:effectRef>
+            <a:fontRef idx="minor">
+              <a:schemeClr val="tx1"/>
+            </a:fontRef>
+          </p:style>
+        </p:cxnSp>
+        <p:cxnSp>
+          <p:nvCxnSpPr>
+            <p:cNvPr id="8" name="Gerade Verbindung mit Pfeil 7"/>
+            <p:cNvCxnSpPr>
+              <a:stCxn id="12" idx="1"/>
+            </p:cNvCxnSpPr>
+            <p:nvPr/>
+          </p:nvCxnSpPr>
+          <p:spPr>
+            <a:xfrm flipH="1">
+              <a:off x="2267744" y="1944479"/>
+              <a:ext cx="1553389" cy="260385"/>
+            </a:xfrm>
+            <a:prstGeom prst="straightConnector1">
+              <a:avLst/>
+            </a:prstGeom>
+            <a:ln>
+              <a:tailEnd type="arrow"/>
+            </a:ln>
+          </p:spPr>
+          <p:style>
+            <a:lnRef idx="1">
+              <a:schemeClr val="accent1"/>
+            </a:lnRef>
+            <a:fillRef idx="0">
+              <a:schemeClr val="accent1"/>
+            </a:fillRef>
+            <a:effectRef idx="0">
+              <a:schemeClr val="accent1"/>
+            </a:effectRef>
+            <a:fontRef idx="minor">
+              <a:schemeClr val="tx1"/>
+            </a:fontRef>
+          </p:style>
+        </p:cxnSp>
+        <p:cxnSp>
+          <p:nvCxnSpPr>
+            <p:cNvPr id="10" name="Gerade Verbindung mit Pfeil 9"/>
+            <p:cNvCxnSpPr>
+              <a:stCxn id="12" idx="1"/>
+            </p:cNvCxnSpPr>
+            <p:nvPr/>
+          </p:nvCxnSpPr>
+          <p:spPr>
+            <a:xfrm flipH="1">
+              <a:off x="2915816" y="1944479"/>
+              <a:ext cx="905317" cy="404401"/>
+            </a:xfrm>
+            <a:prstGeom prst="straightConnector1">
+              <a:avLst/>
+            </a:prstGeom>
+            <a:ln>
+              <a:tailEnd type="arrow"/>
+            </a:ln>
+          </p:spPr>
+          <p:style>
+            <a:lnRef idx="1">
+              <a:schemeClr val="accent1"/>
+            </a:lnRef>
+            <a:fillRef idx="0">
+              <a:schemeClr val="accent1"/>
+            </a:fillRef>
+            <a:effectRef idx="0">
+              <a:schemeClr val="accent1"/>
+            </a:effectRef>
+            <a:fontRef idx="minor">
+              <a:schemeClr val="tx1"/>
+            </a:fontRef>
+          </p:style>
+        </p:cxnSp>
+        <p:cxnSp>
+          <p:nvCxnSpPr>
+            <p:cNvPr id="16" name="Gerade Verbindung mit Pfeil 15"/>
+            <p:cNvCxnSpPr>
+              <a:stCxn id="12" idx="1"/>
+            </p:cNvCxnSpPr>
+            <p:nvPr/>
+          </p:nvCxnSpPr>
+          <p:spPr>
+            <a:xfrm flipH="1">
+              <a:off x="1907704" y="1944479"/>
+              <a:ext cx="1913429" cy="745813"/>
+            </a:xfrm>
+            <a:prstGeom prst="straightConnector1">
+              <a:avLst/>
+            </a:prstGeom>
+            <a:ln>
+              <a:tailEnd type="arrow"/>
+            </a:ln>
+          </p:spPr>
+          <p:style>
+            <a:lnRef idx="1">
+              <a:schemeClr val="accent1"/>
+            </a:lnRef>
+            <a:fillRef idx="0">
+              <a:schemeClr val="accent1"/>
+            </a:fillRef>
+            <a:effectRef idx="0">
+              <a:schemeClr val="accent1"/>
+            </a:effectRef>
+            <a:fontRef idx="minor">
+              <a:schemeClr val="tx1"/>
+            </a:fontRef>
+          </p:style>
+        </p:cxnSp>
+        <p:cxnSp>
+          <p:nvCxnSpPr>
+            <p:cNvPr id="18" name="Gerade Verbindung mit Pfeil 17"/>
+            <p:cNvCxnSpPr>
+              <a:stCxn id="13" idx="1"/>
+            </p:cNvCxnSpPr>
+            <p:nvPr/>
+          </p:nvCxnSpPr>
+          <p:spPr>
+            <a:xfrm flipH="1">
+              <a:off x="2627784" y="2874958"/>
+              <a:ext cx="1193349" cy="121994"/>
+            </a:xfrm>
+            <a:prstGeom prst="straightConnector1">
+              <a:avLst/>
+            </a:prstGeom>
+            <a:ln>
+              <a:tailEnd type="arrow"/>
+            </a:ln>
+          </p:spPr>
+          <p:style>
+            <a:lnRef idx="1">
+              <a:schemeClr val="accent1"/>
+            </a:lnRef>
+            <a:fillRef idx="0">
+              <a:schemeClr val="accent1"/>
+            </a:fillRef>
+            <a:effectRef idx="0">
+              <a:schemeClr val="accent1"/>
+            </a:effectRef>
+            <a:fontRef idx="minor">
+              <a:schemeClr val="tx1"/>
+            </a:fontRef>
+          </p:style>
+        </p:cxnSp>
+        <p:cxnSp>
+          <p:nvCxnSpPr>
+            <p:cNvPr id="20" name="Gerade Verbindung mit Pfeil 19"/>
+            <p:cNvCxnSpPr>
+              <a:stCxn id="13" idx="1"/>
+            </p:cNvCxnSpPr>
+            <p:nvPr/>
+          </p:nvCxnSpPr>
+          <p:spPr>
+            <a:xfrm flipH="1">
+              <a:off x="2699792" y="2874958"/>
+              <a:ext cx="1121341" cy="338018"/>
+            </a:xfrm>
+            <a:prstGeom prst="straightConnector1">
+              <a:avLst/>
+            </a:prstGeom>
+            <a:ln>
+              <a:tailEnd type="arrow"/>
+            </a:ln>
+          </p:spPr>
+          <p:style>
+            <a:lnRef idx="1">
+              <a:schemeClr val="accent1"/>
+            </a:lnRef>
+            <a:fillRef idx="0">
+              <a:schemeClr val="accent1"/>
+            </a:fillRef>
+            <a:effectRef idx="0">
+              <a:schemeClr val="accent1"/>
+            </a:effectRef>
+            <a:fontRef idx="minor">
+              <a:schemeClr val="tx1"/>
+            </a:fontRef>
+          </p:style>
+        </p:cxnSp>
+        <p:cxnSp>
+          <p:nvCxnSpPr>
+            <p:cNvPr id="22" name="Gerade Verbindung mit Pfeil 21"/>
+            <p:cNvCxnSpPr>
+              <a:stCxn id="14" idx="1"/>
+            </p:cNvCxnSpPr>
+            <p:nvPr/>
+          </p:nvCxnSpPr>
+          <p:spPr>
+            <a:xfrm flipH="1" flipV="1">
+              <a:off x="3368474" y="3573016"/>
+              <a:ext cx="555454" cy="60612"/>
+            </a:xfrm>
+            <a:prstGeom prst="straightConnector1">
+              <a:avLst/>
+            </a:prstGeom>
+            <a:ln>
+              <a:tailEnd type="arrow"/>
+            </a:ln>
+          </p:spPr>
+          <p:style>
+            <a:lnRef idx="1">
+              <a:schemeClr val="accent1"/>
+            </a:lnRef>
+            <a:fillRef idx="0">
+              <a:schemeClr val="accent1"/>
+            </a:fillRef>
+            <a:effectRef idx="0">
+              <a:schemeClr val="accent1"/>
+            </a:effectRef>
+            <a:fontRef idx="minor">
+              <a:schemeClr val="tx1"/>
+            </a:fontRef>
+          </p:style>
+        </p:cxnSp>
+        <p:cxnSp>
+          <p:nvCxnSpPr>
+            <p:cNvPr id="30" name="Gerade Verbindung mit Pfeil 29"/>
+            <p:cNvCxnSpPr>
+              <a:stCxn id="14" idx="1"/>
+            </p:cNvCxnSpPr>
+            <p:nvPr/>
+          </p:nvCxnSpPr>
+          <p:spPr>
+            <a:xfrm flipH="1">
+              <a:off x="3368474" y="3633628"/>
+              <a:ext cx="555454" cy="227420"/>
+            </a:xfrm>
+            <a:prstGeom prst="straightConnector1">
+              <a:avLst/>
+            </a:prstGeom>
+            <a:ln>
+              <a:tailEnd type="arrow"/>
+            </a:ln>
+          </p:spPr>
+          <p:style>
+            <a:lnRef idx="1">
+              <a:schemeClr val="accent1"/>
+            </a:lnRef>
+            <a:fillRef idx="0">
+              <a:schemeClr val="accent1"/>
+            </a:fillRef>
+            <a:effectRef idx="0">
+              <a:schemeClr val="accent1"/>
+            </a:effectRef>
+            <a:fontRef idx="minor">
+              <a:schemeClr val="tx1"/>
+            </a:fontRef>
+          </p:style>
+        </p:cxnSp>
+        <p:cxnSp>
+          <p:nvCxnSpPr>
+            <p:cNvPr id="32" name="Gerade Verbindung mit Pfeil 31"/>
+            <p:cNvCxnSpPr>
+              <a:stCxn id="14" idx="1"/>
+            </p:cNvCxnSpPr>
+            <p:nvPr/>
+          </p:nvCxnSpPr>
+          <p:spPr>
+            <a:xfrm flipH="1">
+              <a:off x="2627784" y="3633628"/>
+              <a:ext cx="1296144" cy="443444"/>
+            </a:xfrm>
+            <a:prstGeom prst="straightConnector1">
+              <a:avLst/>
+            </a:prstGeom>
+            <a:ln>
+              <a:tailEnd type="arrow"/>
+            </a:ln>
+          </p:spPr>
+          <p:style>
+            <a:lnRef idx="1">
+              <a:schemeClr val="accent1"/>
+            </a:lnRef>
+            <a:fillRef idx="0">
+              <a:schemeClr val="accent1"/>
+            </a:fillRef>
+            <a:effectRef idx="0">
+              <a:schemeClr val="accent1"/>
+            </a:effectRef>
+            <a:fontRef idx="minor">
+              <a:schemeClr val="tx1"/>
+            </a:fontRef>
+          </p:style>
+        </p:cxnSp>
+        <p:cxnSp>
+          <p:nvCxnSpPr>
+            <p:cNvPr id="34" name="Gerade Verbindung mit Pfeil 33"/>
+            <p:cNvCxnSpPr>
+              <a:stCxn id="14" idx="1"/>
+            </p:cNvCxnSpPr>
+            <p:nvPr/>
+          </p:nvCxnSpPr>
+          <p:spPr>
+            <a:xfrm flipH="1">
+              <a:off x="2915816" y="3633628"/>
+              <a:ext cx="1008112" cy="731476"/>
+            </a:xfrm>
+            <a:prstGeom prst="straightConnector1">
+              <a:avLst/>
+            </a:prstGeom>
+            <a:ln>
+              <a:tailEnd type="arrow"/>
+            </a:ln>
+          </p:spPr>
+          <p:style>
+            <a:lnRef idx="1">
+              <a:schemeClr val="accent1"/>
+            </a:lnRef>
+            <a:fillRef idx="0">
+              <a:schemeClr val="accent1"/>
+            </a:fillRef>
+            <a:effectRef idx="0">
+              <a:schemeClr val="accent1"/>
+            </a:effectRef>
+            <a:fontRef idx="minor">
+              <a:schemeClr val="tx1"/>
+            </a:fontRef>
+          </p:style>
+        </p:cxnSp>
+      </p:grpSp>
+      <p:sp>
+        <p:nvSpPr>
+          <p:cNvPr id="36" name="Rechteck 35"/>
+          <p:cNvSpPr/>
+          <p:nvPr/>
+        </p:nvSpPr>
+        <p:spPr>
+          <a:xfrm>
+            <a:off x="251520" y="4149080"/>
+            <a:ext cx="2364552" cy="720080"/>
+          </a:xfrm>
+          <a:prstGeom prst="rect">
+            <a:avLst/>
+          </a:prstGeom>
+        </p:spPr>
+        <p:style>
+          <a:lnRef idx="2">
+            <a:schemeClr val="accent1">
+              <a:shade val="50000"/>
+            </a:schemeClr>
+          </a:lnRef>
+          <a:fillRef idx="1">
+            <a:schemeClr val="accent1"/>
+          </a:fillRef>
+          <a:effectRef idx="0">
+            <a:schemeClr val="accent1"/>
+          </a:effectRef>
+          <a:fontRef idx="minor">
+            <a:schemeClr val="lt1"/>
+          </a:fontRef>
+        </p:style>
+        <p:txBody>
+          <a:bodyPr rtlCol="0" anchor="t"/>
+          <a:lstStyle/>
+          <a:p>
+            <a:r>
+              <a:rPr lang="de-DE" b="1" dirty="0" err="1" smtClean="0"/>
+              <a:t>IProject</a:t>
+            </a:r>
+            <a:endParaRPr lang="de-DE" b="1" dirty="0" smtClean="0"/>
+          </a:p>
+          <a:p>
+            <a:r>
+              <a:rPr lang="de-DE" dirty="0" smtClean="0"/>
+              <a:t>String </a:t>
+            </a:r>
+            <a:r>
+              <a:rPr lang="de-DE" dirty="0" err="1" smtClean="0"/>
+              <a:t>Projectname</a:t>
+            </a:r>
+            <a:endParaRPr lang="de-DE" dirty="0"/>
+          </a:p>
+        </p:txBody>
+      </p:sp>
+      <p:sp>
+        <p:nvSpPr>
+          <p:cNvPr id="37" name="Rechteck 36"/>
+          <p:cNvSpPr/>
+          <p:nvPr/>
+        </p:nvSpPr>
+        <p:spPr>
+          <a:xfrm>
+            <a:off x="251520" y="5013176"/>
+            <a:ext cx="2364552" cy="936104"/>
+          </a:xfrm>
+          <a:prstGeom prst="rect">
+            <a:avLst/>
+          </a:prstGeom>
+        </p:spPr>
+        <p:style>
+          <a:lnRef idx="2">
+            <a:schemeClr val="accent1">
+              <a:shade val="50000"/>
+            </a:schemeClr>
+          </a:lnRef>
+          <a:fillRef idx="1">
+            <a:schemeClr val="accent1"/>
+          </a:fillRef>
+          <a:effectRef idx="0">
+            <a:schemeClr val="accent1"/>
+          </a:effectRef>
+          <a:fontRef idx="minor">
+            <a:schemeClr val="lt1"/>
+          </a:fontRef>
+        </p:style>
+        <p:txBody>
+          <a:bodyPr rtlCol="0" anchor="t"/>
+          <a:lstStyle/>
+          <a:p>
+            <a:r>
+              <a:rPr lang="de-DE" b="1" dirty="0" err="1" smtClean="0"/>
+              <a:t>IProjectFolder</a:t>
+            </a:r>
+            <a:endParaRPr lang="de-DE" b="1" dirty="0" smtClean="0"/>
+          </a:p>
+          <a:p>
+            <a:r>
+              <a:rPr lang="de-DE" dirty="0" smtClean="0"/>
+              <a:t>String Name</a:t>
+            </a:r>
+          </a:p>
+          <a:p>
+            <a:r>
+              <a:rPr lang="de-DE" dirty="0" smtClean="0"/>
+              <a:t>Project </a:t>
+            </a:r>
+            <a:r>
+              <a:rPr lang="de-DE" dirty="0" err="1" smtClean="0"/>
+              <a:t>ParentProject</a:t>
+            </a:r>
+            <a:endParaRPr lang="de-DE" dirty="0"/>
+          </a:p>
+        </p:txBody>
+      </p:sp>
+      <p:sp>
+        <p:nvSpPr>
+          <p:cNvPr id="38" name="Rechteck 37"/>
+          <p:cNvSpPr/>
+          <p:nvPr/>
+        </p:nvSpPr>
+        <p:spPr>
+          <a:xfrm>
+            <a:off x="2853176" y="4149080"/>
+            <a:ext cx="2654928" cy="720080"/>
+          </a:xfrm>
+          <a:prstGeom prst="rect">
+            <a:avLst/>
+          </a:prstGeom>
+        </p:spPr>
+        <p:style>
+          <a:lnRef idx="2">
+            <a:schemeClr val="accent1">
+              <a:shade val="50000"/>
+            </a:schemeClr>
+          </a:lnRef>
+          <a:fillRef idx="1">
+            <a:schemeClr val="accent1"/>
+          </a:fillRef>
+          <a:effectRef idx="0">
+            <a:schemeClr val="accent1"/>
+          </a:effectRef>
+          <a:fontRef idx="minor">
+            <a:schemeClr val="lt1"/>
+          </a:fontRef>
+        </p:style>
+        <p:txBody>
+          <a:bodyPr rtlCol="0" anchor="t"/>
+          <a:lstStyle/>
+          <a:p>
+            <a:r>
+              <a:rPr lang="de-DE" b="1" dirty="0" err="1" smtClean="0"/>
+              <a:t>IContentFolder</a:t>
+            </a:r>
+            <a:endParaRPr lang="de-DE" b="1" dirty="0" smtClean="0"/>
+          </a:p>
+          <a:p>
+            <a:r>
+              <a:rPr lang="de-DE" dirty="0" err="1" smtClean="0"/>
+              <a:t>ListOf</a:t>
+            </a:r>
+            <a:r>
+              <a:rPr lang="de-DE" dirty="0" smtClean="0"/>
+              <a:t>&lt;</a:t>
+            </a:r>
+            <a:r>
+              <a:rPr lang="de-DE" dirty="0" err="1" smtClean="0"/>
+              <a:t>IContent</a:t>
+            </a:r>
+            <a:r>
+              <a:rPr lang="de-DE" dirty="0" smtClean="0"/>
+              <a:t>&gt; Contents</a:t>
+            </a:r>
+          </a:p>
+        </p:txBody>
+      </p:sp>
+      <p:sp>
+        <p:nvSpPr>
+          <p:cNvPr id="39" name="Rechteck 38"/>
+          <p:cNvSpPr/>
+          <p:nvPr/>
+        </p:nvSpPr>
+        <p:spPr>
+          <a:xfrm>
+            <a:off x="2835923" y="5013176"/>
+            <a:ext cx="3032222" cy="1224136"/>
+          </a:xfrm>
+          <a:prstGeom prst="rect">
+            <a:avLst/>
+          </a:prstGeom>
+        </p:spPr>
+        <p:style>
+          <a:lnRef idx="2">
+            <a:schemeClr val="accent1">
+              <a:shade val="50000"/>
+            </a:schemeClr>
+          </a:lnRef>
+          <a:fillRef idx="1">
+            <a:schemeClr val="accent1"/>
+          </a:fillRef>
+          <a:effectRef idx="0">
+            <a:schemeClr val="accent1"/>
+          </a:effectRef>
+          <a:fontRef idx="minor">
+            <a:schemeClr val="lt1"/>
+          </a:fontRef>
+        </p:style>
+        <p:txBody>
+          <a:bodyPr rtlCol="0" anchor="t"/>
+          <a:lstStyle/>
+          <a:p>
+            <a:r>
+              <a:rPr lang="de-DE" b="1" dirty="0" err="1" smtClean="0"/>
+              <a:t>IContent</a:t>
+            </a:r>
+            <a:endParaRPr lang="de-DE" b="1" dirty="0" smtClean="0"/>
+          </a:p>
+          <a:p>
+            <a:r>
+              <a:rPr lang="de-DE" dirty="0" smtClean="0"/>
+              <a:t>String </a:t>
+            </a:r>
+            <a:r>
+              <a:rPr lang="de-DE" dirty="0" err="1" smtClean="0"/>
+              <a:t>DisplayName</a:t>
+            </a:r>
+            <a:endParaRPr lang="de-DE" dirty="0" smtClean="0"/>
+          </a:p>
+          <a:p>
+            <a:r>
+              <a:rPr lang="de-DE" dirty="0" smtClean="0"/>
+              <a:t>String Description</a:t>
+            </a:r>
+          </a:p>
+          <a:p>
+            <a:r>
+              <a:rPr lang="de-DE" dirty="0" err="1" smtClean="0"/>
+              <a:t>IContentFolder</a:t>
+            </a:r>
+            <a:r>
+              <a:rPr lang="de-DE" dirty="0" smtClean="0"/>
+              <a:t> </a:t>
+            </a:r>
+            <a:r>
+              <a:rPr lang="de-DE" dirty="0" err="1" smtClean="0"/>
+              <a:t>ParentFolder</a:t>
+            </a:r>
+            <a:endParaRPr lang="de-DE" dirty="0" smtClean="0"/>
+          </a:p>
+        </p:txBody>
+      </p:sp>
+    </p:spTree>
+    <p:extLst>
+      <p:ext uri="{BB962C8B-B14F-4D97-AF65-F5344CB8AC3E}">
+        <p14:creationId xmlns:p14="http://schemas.microsoft.com/office/powerpoint/2010/main" val="991462268"/>
       </p:ext>
     </p:extLst>
   </p:cSld>

</xml_diff>